<commit_message>
remove participant record sheet into raw data
</commit_message>
<xml_diff>
--- a/4_Reports/2025_AutumnSummary_wjq.pptx
+++ b/4_Reports/2025_AutumnSummary_wjq.pptx
@@ -6,7 +6,7 @@
     <p:sldMasterId id="2147483660" r:id="rId2"/>
   </p:sldMasterIdLst>
   <p:notesMasterIdLst>
-    <p:notesMasterId r:id="rId12"/>
+    <p:notesMasterId r:id="rId14"/>
   </p:notesMasterIdLst>
   <p:sldIdLst>
     <p:sldId id="298" r:id="rId3"/>
@@ -18,6 +18,8 @@
     <p:sldId id="312" r:id="rId9"/>
     <p:sldId id="313" r:id="rId10"/>
     <p:sldId id="307" r:id="rId11"/>
+    <p:sldId id="314" r:id="rId12"/>
+    <p:sldId id="315" r:id="rId13"/>
   </p:sldIdLst>
   <p:sldSz cx="12192000" cy="6858000"/>
   <p:notesSz cx="6858000" cy="9144000"/>
@@ -614,6 +616,80 @@
           <a:p>
             <a:r>
               <a:rPr lang="zh-CN" altLang="en-US" dirty="0"/>
+              <a:t>为什么要做这个项目呢？</a:t>
+            </a:r>
+            <a:endParaRPr lang="en-US" altLang="zh-CN" dirty="0"/>
+          </a:p>
+          <a:p>
+            <a:r>
+              <a:rPr lang="zh-CN" altLang="en-US" dirty="0"/>
+              <a:t>主要的研究背景在于，</a:t>
+            </a:r>
+            <a:r>
+              <a:rPr lang="zh-CN" altLang="en-US" sz="1200" kern="1200" dirty="0">
+                <a:solidFill>
+                  <a:schemeClr val="tx1"/>
+                </a:solidFill>
+                <a:effectLst/>
+                <a:latin typeface="+mn-lt"/>
+                <a:ea typeface="+mn-ea"/>
+                <a:cs typeface="+mn-cs"/>
+              </a:rPr>
+              <a:t>关于</a:t>
+            </a:r>
+            <a:r>
+              <a:rPr lang="zh-CN" altLang="zh-CN" sz="1200" kern="1200" dirty="0">
+                <a:solidFill>
+                  <a:schemeClr val="tx1"/>
+                </a:solidFill>
+                <a:effectLst/>
+                <a:latin typeface="+mn-lt"/>
+                <a:ea typeface="+mn-ea"/>
+                <a:cs typeface="+mn-cs"/>
+              </a:rPr>
+              <a:t>自我优势效应何时出现存在争议，有研究认为自我优势自动产生，有研究认为自我优势</a:t>
+            </a:r>
+            <a:r>
+              <a:rPr lang="zh-CN" altLang="en-US" sz="1200" kern="1200" dirty="0">
+                <a:solidFill>
+                  <a:schemeClr val="tx1"/>
+                </a:solidFill>
+                <a:effectLst/>
+                <a:latin typeface="+mn-lt"/>
+                <a:ea typeface="+mn-ea"/>
+                <a:cs typeface="+mn-cs"/>
+              </a:rPr>
+              <a:t>的产生</a:t>
+            </a:r>
+            <a:r>
+              <a:rPr lang="zh-CN" altLang="zh-CN" sz="1200" kern="1200" dirty="0">
+                <a:solidFill>
+                  <a:schemeClr val="tx1"/>
+                </a:solidFill>
+                <a:effectLst/>
+                <a:latin typeface="+mn-lt"/>
+                <a:ea typeface="+mn-ea"/>
+                <a:cs typeface="+mn-cs"/>
+              </a:rPr>
+              <a:t>依赖于自我与任务的相关性。</a:t>
+            </a:r>
+            <a:r>
+              <a:rPr lang="zh-CN" altLang="en-US" sz="1200" kern="1200" dirty="0">
+                <a:solidFill>
+                  <a:schemeClr val="tx1"/>
+                </a:solidFill>
+                <a:effectLst/>
+                <a:latin typeface="+mn-lt"/>
+                <a:ea typeface="+mn-ea"/>
+                <a:cs typeface="+mn-cs"/>
+              </a:rPr>
+              <a:t>所以我们这个项目就是去验证任务相关性是否会调节自我优势效应，从而去回答自我优势效应是自下而上加工还是自上而下加工的。</a:t>
+            </a:r>
+            <a:endParaRPr lang="en-US" altLang="zh-CN" dirty="0"/>
+          </a:p>
+          <a:p>
+            <a:r>
+              <a:rPr lang="zh-CN" altLang="en-US" dirty="0"/>
               <a:t>为了研究这个问题，设置了三项实验。实验</a:t>
             </a:r>
             <a:r>
@@ -810,6 +886,114 @@
     <p:extLst>
       <p:ext uri="{BB962C8B-B14F-4D97-AF65-F5344CB8AC3E}">
         <p14:creationId xmlns:p14="http://schemas.microsoft.com/office/powerpoint/2010/main" val="3766367299"/>
+      </p:ext>
+    </p:extLst>
+  </p:cSld>
+  <p:clrMapOvr>
+    <a:masterClrMapping/>
+  </p:clrMapOvr>
+</p:notes>
+</file>
+
+<file path=ppt/notesSlides/notesSlide4.xml><?xml version="1.0" encoding="utf-8"?>
+<p:notes xmlns:a="http://schemas.openxmlformats.org/drawingml/2006/main" xmlns:r="http://schemas.openxmlformats.org/officeDocument/2006/relationships" xmlns:p="http://schemas.openxmlformats.org/presentationml/2006/main">
+  <p:cSld>
+    <p:spTree>
+      <p:nvGrpSpPr>
+        <p:cNvPr id="1" name="">
+          <a:extLst>
+            <a:ext uri="{FF2B5EF4-FFF2-40B4-BE49-F238E27FC236}">
+              <a16:creationId xmlns:a16="http://schemas.microsoft.com/office/drawing/2014/main" id="{251D7195-3812-381C-3992-2DB5BC34D492}"/>
+            </a:ext>
+          </a:extLst>
+        </p:cNvPr>
+        <p:cNvGrpSpPr/>
+        <p:nvPr/>
+      </p:nvGrpSpPr>
+      <p:grpSpPr>
+        <a:xfrm>
+          <a:off x="0" y="0"/>
+          <a:ext cx="0" cy="0"/>
+          <a:chOff x="0" y="0"/>
+          <a:chExt cx="0" cy="0"/>
+        </a:xfrm>
+      </p:grpSpPr>
+      <p:sp>
+        <p:nvSpPr>
+          <p:cNvPr id="2" name="幻灯片图像占位符 1">
+            <a:extLst>
+              <a:ext uri="{FF2B5EF4-FFF2-40B4-BE49-F238E27FC236}">
+                <a16:creationId xmlns:a16="http://schemas.microsoft.com/office/drawing/2014/main" id="{8AEBC788-4545-7BDD-C475-4086C21DC62A}"/>
+              </a:ext>
+            </a:extLst>
+          </p:cNvPr>
+          <p:cNvSpPr>
+            <a:spLocks noGrp="1" noRot="1" noChangeAspect="1"/>
+          </p:cNvSpPr>
+          <p:nvPr>
+            <p:ph type="sldImg"/>
+          </p:nvPr>
+        </p:nvSpPr>
+        <p:spPr/>
+      </p:sp>
+      <p:sp>
+        <p:nvSpPr>
+          <p:cNvPr id="3" name="备注占位符 2">
+            <a:extLst>
+              <a:ext uri="{FF2B5EF4-FFF2-40B4-BE49-F238E27FC236}">
+                <a16:creationId xmlns:a16="http://schemas.microsoft.com/office/drawing/2014/main" id="{1D438C12-839F-A3BC-C63D-CDA401DB1024}"/>
+              </a:ext>
+            </a:extLst>
+          </p:cNvPr>
+          <p:cNvSpPr>
+            <a:spLocks noGrp="1"/>
+          </p:cNvSpPr>
+          <p:nvPr>
+            <p:ph type="body" idx="1"/>
+          </p:nvPr>
+        </p:nvSpPr>
+        <p:spPr/>
+        <p:txBody>
+          <a:bodyPr/>
+          <a:lstStyle/>
+          <a:p>
+            <a:endParaRPr lang="zh-CN" altLang="en-US" dirty="0"/>
+          </a:p>
+        </p:txBody>
+      </p:sp>
+      <p:sp>
+        <p:nvSpPr>
+          <p:cNvPr id="4" name="灯片编号占位符 3">
+            <a:extLst>
+              <a:ext uri="{FF2B5EF4-FFF2-40B4-BE49-F238E27FC236}">
+                <a16:creationId xmlns:a16="http://schemas.microsoft.com/office/drawing/2014/main" id="{21ACD635-6467-FB26-6DD6-C5A9F94F42A8}"/>
+              </a:ext>
+            </a:extLst>
+          </p:cNvPr>
+          <p:cNvSpPr>
+            <a:spLocks noGrp="1"/>
+          </p:cNvSpPr>
+          <p:nvPr>
+            <p:ph type="sldNum" sz="quarter" idx="5"/>
+          </p:nvPr>
+        </p:nvSpPr>
+        <p:spPr/>
+        <p:txBody>
+          <a:bodyPr/>
+          <a:lstStyle/>
+          <a:p>
+            <a:fld id="{35721C67-7CF2-4365-9654-A803E7E3626D}" type="slidenum">
+              <a:rPr lang="zh-CN" altLang="en-US" smtClean="0"/>
+              <a:t>10</a:t>
+            </a:fld>
+            <a:endParaRPr lang="zh-CN" altLang="en-US"/>
+          </a:p>
+        </p:txBody>
+      </p:sp>
+    </p:spTree>
+    <p:extLst>
+      <p:ext uri="{BB962C8B-B14F-4D97-AF65-F5344CB8AC3E}">
+        <p14:creationId xmlns:p14="http://schemas.microsoft.com/office/powerpoint/2010/main" val="1837686139"/>
       </p:ext>
     </p:extLst>
   </p:cSld>
@@ -7099,7 +7283,7 @@
             </a:r>
             <a:r>
               <a:rPr lang="en-US" altLang="zh-CN" dirty="0"/>
-              <a:t>2025</a:t>
+              <a:t>2026</a:t>
             </a:r>
             <a:r>
               <a:rPr lang="zh-CN" altLang="en-US" dirty="0"/>
@@ -7107,7 +7291,7 @@
             </a:r>
             <a:r>
               <a:rPr lang="en-US" altLang="zh-CN" dirty="0"/>
-              <a:t>6</a:t>
+              <a:t>1</a:t>
             </a:r>
             <a:r>
               <a:rPr lang="zh-CN" altLang="en-US" dirty="0"/>
@@ -7115,7 +7299,7 @@
             </a:r>
             <a:r>
               <a:rPr lang="en-US" altLang="zh-CN" dirty="0"/>
-              <a:t>16</a:t>
+              <a:t>18</a:t>
             </a:r>
             <a:r>
               <a:rPr lang="zh-CN" altLang="en-US" dirty="0"/>
@@ -7192,6 +7376,364 @@
   </p:cSld>
   <p:clrMapOvr>
     <a:overrideClrMapping bg1="lt1" tx1="dk1" bg2="lt2" tx2="dk2" accent1="accent1" accent2="accent2" accent3="accent3" accent4="accent4" accent5="accent5" accent6="accent6" hlink="hlink" folHlink="folHlink"/>
+  </p:clrMapOvr>
+</p:sld>
+</file>
+
+<file path=ppt/slides/slide10.xml><?xml version="1.0" encoding="utf-8"?>
+<p:sld xmlns:a="http://schemas.openxmlformats.org/drawingml/2006/main" xmlns:r="http://schemas.openxmlformats.org/officeDocument/2006/relationships" xmlns:p="http://schemas.openxmlformats.org/presentationml/2006/main">
+  <p:cSld>
+    <p:spTree>
+      <p:nvGrpSpPr>
+        <p:cNvPr id="1" name="">
+          <a:extLst>
+            <a:ext uri="{FF2B5EF4-FFF2-40B4-BE49-F238E27FC236}">
+              <a16:creationId xmlns:a16="http://schemas.microsoft.com/office/drawing/2014/main" id="{E01E84FB-CE6B-8747-A804-58CE5B9566CC}"/>
+            </a:ext>
+          </a:extLst>
+        </p:cNvPr>
+        <p:cNvGrpSpPr/>
+        <p:nvPr/>
+      </p:nvGrpSpPr>
+      <p:grpSpPr>
+        <a:xfrm>
+          <a:off x="0" y="0"/>
+          <a:ext cx="0" cy="0"/>
+          <a:chOff x="0" y="0"/>
+          <a:chExt cx="0" cy="0"/>
+        </a:xfrm>
+      </p:grpSpPr>
+      <p:sp>
+        <p:nvSpPr>
+          <p:cNvPr id="9" name="标题 8">
+            <a:extLst>
+              <a:ext uri="{FF2B5EF4-FFF2-40B4-BE49-F238E27FC236}">
+                <a16:creationId xmlns:a16="http://schemas.microsoft.com/office/drawing/2014/main" id="{4D9C4340-1DAD-EC43-7209-D7F4AADEC754}"/>
+              </a:ext>
+            </a:extLst>
+          </p:cNvPr>
+          <p:cNvSpPr>
+            <a:spLocks noGrp="1"/>
+          </p:cNvSpPr>
+          <p:nvPr>
+            <p:ph type="title" idx="4294967295"/>
+          </p:nvPr>
+        </p:nvSpPr>
+        <p:spPr>
+          <a:xfrm>
+            <a:off x="0" y="0"/>
+            <a:ext cx="10515600" cy="1325563"/>
+          </a:xfrm>
+        </p:spPr>
+        <p:txBody>
+          <a:bodyPr/>
+          <a:lstStyle/>
+          <a:p>
+            <a:r>
+              <a:rPr lang="zh-CN" altLang="en-US" dirty="0">
+                <a:latin typeface="宋体" panose="02010600030101010101" pitchFamily="2" charset="-122"/>
+                <a:ea typeface="宋体" panose="02010600030101010101" pitchFamily="2" charset="-122"/>
+              </a:rPr>
+              <a:t>你会获得：</a:t>
+            </a:r>
+          </a:p>
+        </p:txBody>
+      </p:sp>
+      <p:sp>
+        <p:nvSpPr>
+          <p:cNvPr id="4" name="内容占位符 3">
+            <a:extLst>
+              <a:ext uri="{FF2B5EF4-FFF2-40B4-BE49-F238E27FC236}">
+                <a16:creationId xmlns:a16="http://schemas.microsoft.com/office/drawing/2014/main" id="{628C9A91-233A-0BDD-ABB5-E23D30FD7F23}"/>
+              </a:ext>
+            </a:extLst>
+          </p:cNvPr>
+          <p:cNvSpPr>
+            <a:spLocks noGrp="1"/>
+          </p:cNvSpPr>
+          <p:nvPr>
+            <p:ph idx="4294967295"/>
+          </p:nvPr>
+        </p:nvSpPr>
+        <p:spPr>
+          <a:xfrm>
+            <a:off x="154641" y="1296988"/>
+            <a:ext cx="11907184" cy="4832879"/>
+          </a:xfrm>
+        </p:spPr>
+        <p:txBody>
+          <a:bodyPr>
+            <a:normAutofit/>
+          </a:bodyPr>
+          <a:lstStyle/>
+          <a:p>
+            <a:pPr>
+              <a:lnSpc>
+                <a:spcPct val="150000"/>
+              </a:lnSpc>
+            </a:pPr>
+            <a:r>
+              <a:rPr lang="zh-CN" altLang="en-US" sz="2000" b="1" dirty="0">
+                <a:solidFill>
+                  <a:schemeClr val="tx1">
+                    <a:lumMod val="65000"/>
+                    <a:lumOff val="35000"/>
+                  </a:schemeClr>
+                </a:solidFill>
+                <a:latin typeface="宋体" panose="02010600030101010101" pitchFamily="2" charset="-122"/>
+                <a:ea typeface="宋体" panose="02010600030101010101" pitchFamily="2" charset="-122"/>
+              </a:rPr>
+              <a:t>使用</a:t>
+            </a:r>
+            <a:r>
+              <a:rPr lang="en-US" altLang="zh-CN" sz="2000" b="1" dirty="0" err="1">
+                <a:solidFill>
+                  <a:schemeClr val="tx1">
+                    <a:lumMod val="65000"/>
+                    <a:lumOff val="35000"/>
+                  </a:schemeClr>
+                </a:solidFill>
+                <a:latin typeface="宋体" panose="02010600030101010101" pitchFamily="2" charset="-122"/>
+                <a:ea typeface="宋体" panose="02010600030101010101" pitchFamily="2" charset="-122"/>
+              </a:rPr>
+              <a:t>Jspsych</a:t>
+            </a:r>
+            <a:r>
+              <a:rPr lang="zh-CN" altLang="en-US" sz="2000" b="1" dirty="0">
+                <a:solidFill>
+                  <a:schemeClr val="tx1">
+                    <a:lumMod val="65000"/>
+                    <a:lumOff val="35000"/>
+                  </a:schemeClr>
+                </a:solidFill>
+                <a:latin typeface="宋体" panose="02010600030101010101" pitchFamily="2" charset="-122"/>
+                <a:ea typeface="宋体" panose="02010600030101010101" pitchFamily="2" charset="-122"/>
+              </a:rPr>
+              <a:t>编写在线程序的代码；</a:t>
+            </a:r>
+            <a:endParaRPr lang="en-US" altLang="zh-CN" sz="2000" b="1" dirty="0">
+              <a:solidFill>
+                <a:schemeClr val="tx1">
+                  <a:lumMod val="65000"/>
+                  <a:lumOff val="35000"/>
+                </a:schemeClr>
+              </a:solidFill>
+              <a:latin typeface="宋体" panose="02010600030101010101" pitchFamily="2" charset="-122"/>
+              <a:ea typeface="宋体" panose="02010600030101010101" pitchFamily="2" charset="-122"/>
+            </a:endParaRPr>
+          </a:p>
+          <a:p>
+            <a:pPr>
+              <a:lnSpc>
+                <a:spcPct val="150000"/>
+              </a:lnSpc>
+            </a:pPr>
+            <a:r>
+              <a:rPr lang="zh-CN" altLang="en-US" sz="2000" b="1" dirty="0">
+                <a:solidFill>
+                  <a:schemeClr val="tx1">
+                    <a:lumMod val="65000"/>
+                    <a:lumOff val="35000"/>
+                  </a:schemeClr>
+                </a:solidFill>
+                <a:latin typeface="宋体" panose="02010600030101010101" pitchFamily="2" charset="-122"/>
+                <a:ea typeface="宋体" panose="02010600030101010101" pitchFamily="2" charset="-122"/>
+              </a:rPr>
+              <a:t>线上收集数据的操作手册以及数据收集经验；</a:t>
+            </a:r>
+            <a:endParaRPr lang="en-US" altLang="zh-CN" sz="2000" b="1" dirty="0">
+              <a:solidFill>
+                <a:schemeClr val="tx1">
+                  <a:lumMod val="65000"/>
+                  <a:lumOff val="35000"/>
+                </a:schemeClr>
+              </a:solidFill>
+              <a:latin typeface="宋体" panose="02010600030101010101" pitchFamily="2" charset="-122"/>
+              <a:ea typeface="宋体" panose="02010600030101010101" pitchFamily="2" charset="-122"/>
+            </a:endParaRPr>
+          </a:p>
+          <a:p>
+            <a:pPr>
+              <a:lnSpc>
+                <a:spcPct val="150000"/>
+              </a:lnSpc>
+            </a:pPr>
+            <a:r>
+              <a:rPr lang="zh-CN" altLang="en-US" sz="2000" b="1" dirty="0">
+                <a:solidFill>
+                  <a:schemeClr val="tx1">
+                    <a:lumMod val="65000"/>
+                    <a:lumOff val="35000"/>
+                  </a:schemeClr>
+                </a:solidFill>
+                <a:latin typeface="宋体" panose="02010600030101010101" pitchFamily="2" charset="-122"/>
+                <a:ea typeface="宋体" panose="02010600030101010101" pitchFamily="2" charset="-122"/>
+              </a:rPr>
+              <a:t>基于</a:t>
+            </a:r>
+            <a:r>
+              <a:rPr lang="en-US" altLang="zh-CN" sz="2000" b="1" dirty="0">
+                <a:solidFill>
+                  <a:schemeClr val="tx1">
+                    <a:lumMod val="65000"/>
+                    <a:lumOff val="35000"/>
+                  </a:schemeClr>
+                </a:solidFill>
+                <a:latin typeface="宋体" panose="02010600030101010101" pitchFamily="2" charset="-122"/>
+                <a:ea typeface="宋体" panose="02010600030101010101" pitchFamily="2" charset="-122"/>
+              </a:rPr>
+              <a:t>BRMs</a:t>
+            </a:r>
+            <a:r>
+              <a:rPr lang="zh-CN" altLang="en-US" sz="2000" b="1" dirty="0">
+                <a:solidFill>
+                  <a:schemeClr val="tx1">
+                    <a:lumMod val="65000"/>
+                    <a:lumOff val="35000"/>
+                  </a:schemeClr>
+                </a:solidFill>
+                <a:latin typeface="宋体" panose="02010600030101010101" pitchFamily="2" charset="-122"/>
+                <a:ea typeface="宋体" panose="02010600030101010101" pitchFamily="2" charset="-122"/>
+              </a:rPr>
+              <a:t>进行贝叶斯层级模型分析的数据分析经验；</a:t>
+            </a:r>
+            <a:endParaRPr lang="en-US" altLang="zh-CN" sz="2000" b="1" dirty="0">
+              <a:solidFill>
+                <a:schemeClr val="tx1">
+                  <a:lumMod val="65000"/>
+                  <a:lumOff val="35000"/>
+                </a:schemeClr>
+              </a:solidFill>
+              <a:latin typeface="宋体" panose="02010600030101010101" pitchFamily="2" charset="-122"/>
+              <a:ea typeface="宋体" panose="02010600030101010101" pitchFamily="2" charset="-122"/>
+            </a:endParaRPr>
+          </a:p>
+          <a:p>
+            <a:pPr>
+              <a:lnSpc>
+                <a:spcPct val="150000"/>
+              </a:lnSpc>
+            </a:pPr>
+            <a:r>
+              <a:rPr lang="zh-CN" altLang="en-US" sz="2000" b="1" dirty="0">
+                <a:solidFill>
+                  <a:schemeClr val="tx1">
+                    <a:lumMod val="65000"/>
+                    <a:lumOff val="35000"/>
+                  </a:schemeClr>
+                </a:solidFill>
+                <a:latin typeface="宋体" panose="02010600030101010101" pitchFamily="2" charset="-122"/>
+                <a:ea typeface="宋体" panose="02010600030101010101" pitchFamily="2" charset="-122"/>
+              </a:rPr>
+              <a:t>后续的论文发表</a:t>
+            </a:r>
+            <a:endParaRPr lang="en-US" altLang="zh-CN" sz="2000" b="1" dirty="0">
+              <a:solidFill>
+                <a:schemeClr val="tx1">
+                  <a:lumMod val="65000"/>
+                  <a:lumOff val="35000"/>
+                </a:schemeClr>
+              </a:solidFill>
+              <a:latin typeface="宋体" panose="02010600030101010101" pitchFamily="2" charset="-122"/>
+              <a:ea typeface="宋体" panose="02010600030101010101" pitchFamily="2" charset="-122"/>
+            </a:endParaRPr>
+          </a:p>
+        </p:txBody>
+      </p:sp>
+    </p:spTree>
+    <p:extLst>
+      <p:ext uri="{BB962C8B-B14F-4D97-AF65-F5344CB8AC3E}">
+        <p14:creationId xmlns:p14="http://schemas.microsoft.com/office/powerpoint/2010/main" val="330005662"/>
+      </p:ext>
+    </p:extLst>
+  </p:cSld>
+  <p:clrMapOvr>
+    <a:masterClrMapping/>
+  </p:clrMapOvr>
+</p:sld>
+</file>
+
+<file path=ppt/slides/slide11.xml><?xml version="1.0" encoding="utf-8"?>
+<p:sld xmlns:a="http://schemas.openxmlformats.org/drawingml/2006/main" xmlns:r="http://schemas.openxmlformats.org/officeDocument/2006/relationships" xmlns:p="http://schemas.openxmlformats.org/presentationml/2006/main">
+  <p:cSld>
+    <p:spTree>
+      <p:nvGrpSpPr>
+        <p:cNvPr id="1" name=""/>
+        <p:cNvGrpSpPr/>
+        <p:nvPr/>
+      </p:nvGrpSpPr>
+      <p:grpSpPr>
+        <a:xfrm>
+          <a:off x="0" y="0"/>
+          <a:ext cx="0" cy="0"/>
+          <a:chOff x="0" y="0"/>
+          <a:chExt cx="0" cy="0"/>
+        </a:xfrm>
+      </p:grpSpPr>
+      <p:sp>
+        <p:nvSpPr>
+          <p:cNvPr id="2" name="标题 1">
+            <a:extLst>
+              <a:ext uri="{FF2B5EF4-FFF2-40B4-BE49-F238E27FC236}">
+                <a16:creationId xmlns:a16="http://schemas.microsoft.com/office/drawing/2014/main" id="{671F337E-E4C5-6978-4DCF-DB5436B58474}"/>
+              </a:ext>
+            </a:extLst>
+          </p:cNvPr>
+          <p:cNvSpPr txBox="1">
+            <a:spLocks/>
+          </p:cNvSpPr>
+          <p:nvPr/>
+        </p:nvSpPr>
+        <p:spPr>
+          <a:xfrm>
+            <a:off x="4561205" y="3068479"/>
+            <a:ext cx="3069590" cy="721042"/>
+          </a:xfrm>
+          <a:prstGeom prst="rect">
+            <a:avLst/>
+          </a:prstGeom>
+        </p:spPr>
+        <p:txBody>
+          <a:bodyPr/>
+          <a:lstStyle>
+            <a:lvl1pPr algn="l" defTabSz="914400" rtl="0" eaLnBrk="1" latinLnBrk="0" hangingPunct="1">
+              <a:lnSpc>
+                <a:spcPct val="90000"/>
+              </a:lnSpc>
+              <a:spcBef>
+                <a:spcPct val="0"/>
+              </a:spcBef>
+              <a:buNone/>
+              <a:defRPr sz="4400" kern="1200">
+                <a:solidFill>
+                  <a:schemeClr val="tx1"/>
+                </a:solidFill>
+                <a:latin typeface="+mj-lt"/>
+                <a:ea typeface="+mj-ea"/>
+                <a:cs typeface="+mj-cs"/>
+              </a:defRPr>
+            </a:lvl1pPr>
+          </a:lstStyle>
+          <a:p>
+            <a:r>
+              <a:rPr lang="zh-CN" altLang="en-US" dirty="0">
+                <a:latin typeface="微软雅黑" panose="020B0503020204020204" pitchFamily="34" charset="-122"/>
+                <a:ea typeface="微软雅黑" panose="020B0503020204020204" pitchFamily="34" charset="-122"/>
+              </a:rPr>
+              <a:t>谢谢大家！</a:t>
+            </a:r>
+          </a:p>
+        </p:txBody>
+      </p:sp>
+    </p:spTree>
+    <p:extLst>
+      <p:ext uri="{BB962C8B-B14F-4D97-AF65-F5344CB8AC3E}">
+        <p14:creationId xmlns:p14="http://schemas.microsoft.com/office/powerpoint/2010/main" val="4139449618"/>
+      </p:ext>
+    </p:extLst>
+  </p:cSld>
+  <p:clrMapOvr>
+    <a:masterClrMapping/>
   </p:clrMapOvr>
 </p:sld>
 </file>
@@ -7381,7 +7923,7 @@
               </a:lnSpc>
             </a:pPr>
             <a:r>
-              <a:rPr lang="zh-CN" altLang="en-US" sz="2000" b="1" dirty="0">
+              <a:rPr lang="zh-CN" altLang="en-US" sz="2400" b="1" dirty="0">
                 <a:solidFill>
                   <a:schemeClr val="tx1">
                     <a:lumMod val="85000"/>
@@ -7393,7 +7935,7 @@
               </a:rPr>
               <a:t>研究问题</a:t>
             </a:r>
-            <a:endParaRPr lang="en-US" altLang="zh-CN" sz="2000" b="1" dirty="0">
+            <a:endParaRPr lang="en-US" altLang="zh-CN" sz="2400" b="1" dirty="0">
               <a:solidFill>
                 <a:schemeClr val="tx1">
                   <a:lumMod val="85000"/>
@@ -7411,7 +7953,7 @@
               </a:lnSpc>
             </a:pPr>
             <a:r>
-              <a:rPr lang="zh-CN" altLang="en-US" sz="1600" b="1" dirty="0">
+              <a:rPr lang="zh-CN" altLang="en-US" sz="2000" b="1" dirty="0">
                 <a:solidFill>
                   <a:schemeClr val="tx1">
                     <a:lumMod val="65000"/>
@@ -7423,7 +7965,7 @@
               </a:rPr>
               <a:t>任务相关性是否调节自我优势效应？</a:t>
             </a:r>
-            <a:endParaRPr lang="en-US" altLang="zh-CN" sz="1600" b="1" dirty="0">
+            <a:endParaRPr lang="en-US" altLang="zh-CN" sz="2000" b="1" dirty="0">
               <a:solidFill>
                 <a:schemeClr val="tx1">
                   <a:lumMod val="75000"/>
@@ -7441,7 +7983,7 @@
               </a:lnSpc>
             </a:pPr>
             <a:r>
-              <a:rPr lang="zh-CN" altLang="en-US" sz="2000" b="1" dirty="0">
+              <a:rPr lang="zh-CN" altLang="en-US" sz="2400" b="1" dirty="0">
                 <a:solidFill>
                   <a:schemeClr val="tx1">
                     <a:lumMod val="85000"/>
@@ -7453,7 +7995,7 @@
               </a:rPr>
               <a:t>研究目标</a:t>
             </a:r>
-            <a:endParaRPr lang="en-US" altLang="zh-CN" sz="2000" b="1" dirty="0">
+            <a:endParaRPr lang="en-US" altLang="zh-CN" sz="2400" b="1" dirty="0">
               <a:solidFill>
                 <a:schemeClr val="tx1">
                   <a:lumMod val="85000"/>
@@ -7471,7 +8013,7 @@
               </a:lnSpc>
             </a:pPr>
             <a:r>
-              <a:rPr lang="en-US" altLang="zh-CN" sz="1600" b="1" dirty="0">
+              <a:rPr lang="en-US" altLang="zh-CN" sz="2000" b="1" dirty="0">
                 <a:solidFill>
                   <a:schemeClr val="tx1">
                     <a:lumMod val="65000"/>
@@ -7484,7 +8026,7 @@
               <a:t>Exp1</a:t>
             </a:r>
             <a:r>
-              <a:rPr lang="zh-CN" altLang="en-US" sz="1600" b="1" dirty="0">
+              <a:rPr lang="zh-CN" altLang="en-US" sz="2000" b="1" dirty="0">
                 <a:solidFill>
                   <a:schemeClr val="tx1">
                     <a:lumMod val="65000"/>
@@ -7496,7 +8038,7 @@
               </a:rPr>
               <a:t>：探究任务目标对自我优势效应的影响，即自我作为任务目标以及非任务目标时的自我优势效应。（自我与任务目标对立）</a:t>
             </a:r>
-            <a:endParaRPr lang="en-US" altLang="zh-CN" sz="1600" b="1" dirty="0">
+            <a:endParaRPr lang="en-US" altLang="zh-CN" sz="2000" b="1" dirty="0">
               <a:solidFill>
                 <a:schemeClr val="tx1">
                   <a:lumMod val="65000"/>
@@ -7514,7 +8056,7 @@
               </a:lnSpc>
             </a:pPr>
             <a:r>
-              <a:rPr lang="en-US" altLang="zh-CN" sz="1600" b="1" dirty="0">
+              <a:rPr lang="en-US" altLang="zh-CN" sz="2000" b="1" dirty="0">
                 <a:solidFill>
                   <a:schemeClr val="tx1">
                     <a:lumMod val="65000"/>
@@ -7527,7 +8069,7 @@
               <a:t>Exp2</a:t>
             </a:r>
             <a:r>
-              <a:rPr lang="zh-CN" altLang="en-US" sz="1600" b="1" dirty="0">
+              <a:rPr lang="zh-CN" altLang="en-US" sz="2000" b="1" dirty="0">
                 <a:solidFill>
                   <a:schemeClr val="tx1">
                     <a:lumMod val="65000"/>
@@ -7540,7 +8082,7 @@
               <a:t>：</a:t>
             </a:r>
             <a:r>
-              <a:rPr lang="zh-CN" altLang="zh-CN" sz="1600" b="1" dirty="0">
+              <a:rPr lang="zh-CN" altLang="zh-CN" sz="2000" b="1" dirty="0">
                 <a:solidFill>
                   <a:schemeClr val="tx1">
                     <a:lumMod val="65000"/>
@@ -7553,7 +8095,7 @@
               <a:t>探究任务相关性对自我优势效应的影响</a:t>
             </a:r>
             <a:r>
-              <a:rPr lang="zh-CN" altLang="en-US" sz="1600" b="1" dirty="0">
+              <a:rPr lang="zh-CN" altLang="en-US" sz="2000" b="1" dirty="0">
                 <a:solidFill>
                   <a:schemeClr val="tx1">
                     <a:lumMod val="65000"/>
@@ -7565,7 +8107,7 @@
               </a:rPr>
               <a:t>，即自我与任务有关以及自我与任务无关时的自我优势效应。（自我与任务目标无关）</a:t>
             </a:r>
-            <a:endParaRPr lang="en-US" altLang="zh-CN" sz="1600" b="1" dirty="0">
+            <a:endParaRPr lang="en-US" altLang="zh-CN" sz="2000" b="1" dirty="0">
               <a:solidFill>
                 <a:schemeClr val="tx1">
                   <a:lumMod val="65000"/>
@@ -7583,7 +8125,7 @@
               </a:lnSpc>
             </a:pPr>
             <a:r>
-              <a:rPr lang="en-US" altLang="zh-CN" sz="1600" b="1" dirty="0">
+              <a:rPr lang="en-US" altLang="zh-CN" sz="2000" b="1" dirty="0">
                 <a:solidFill>
                   <a:schemeClr val="tx1">
                     <a:lumMod val="65000"/>
@@ -7596,7 +8138,7 @@
               <a:t>Exp3</a:t>
             </a:r>
             <a:r>
-              <a:rPr lang="zh-CN" altLang="en-US" sz="1600" b="1" dirty="0">
+              <a:rPr lang="zh-CN" altLang="en-US" sz="2000" b="1" dirty="0">
                 <a:solidFill>
                   <a:schemeClr val="tx1">
                     <a:lumMod val="65000"/>
@@ -7609,7 +8151,7 @@
               <a:t>：</a:t>
             </a:r>
             <a:r>
-              <a:rPr lang="zh-CN" altLang="zh-CN" sz="1600" b="1" dirty="0">
+              <a:rPr lang="zh-CN" altLang="zh-CN" sz="2000" b="1" dirty="0">
                 <a:solidFill>
                   <a:schemeClr val="tx1">
                     <a:lumMod val="65000"/>
@@ -7621,7 +8163,7 @@
               </a:rPr>
               <a:t>探究不同认知负荷下，任务相关性对自我优势效应的影响。</a:t>
             </a:r>
-            <a:endParaRPr lang="en-US" altLang="zh-CN" sz="1600" b="1" dirty="0">
+            <a:endParaRPr lang="en-US" altLang="zh-CN" sz="2000" b="1" dirty="0">
               <a:solidFill>
                 <a:schemeClr val="tx1">
                   <a:lumMod val="65000"/>
@@ -7809,12 +8351,12 @@
         <p:spPr>
           <a:xfrm>
             <a:off x="154641" y="1296988"/>
-            <a:ext cx="11907184" cy="4832879"/>
+            <a:ext cx="5263179" cy="5416232"/>
           </a:xfrm>
         </p:spPr>
         <p:txBody>
           <a:bodyPr>
-            <a:normAutofit fontScale="85000" lnSpcReduction="10000"/>
+            <a:normAutofit/>
           </a:bodyPr>
           <a:lstStyle/>
           <a:p>
@@ -7824,7 +8366,7 @@
               </a:lnSpc>
             </a:pPr>
             <a:r>
-              <a:rPr lang="zh-CN" altLang="en-US" sz="2400" b="1" dirty="0">
+              <a:rPr lang="zh-CN" altLang="en-US" sz="1800" b="1" dirty="0">
                 <a:solidFill>
                   <a:schemeClr val="tx1">
                     <a:lumMod val="85000"/>
@@ -7836,7 +8378,7 @@
               </a:rPr>
               <a:t>上学期已完成：</a:t>
             </a:r>
-            <a:endParaRPr lang="en-US" altLang="zh-CN" sz="2400" b="1" dirty="0">
+            <a:endParaRPr lang="en-US" altLang="zh-CN" sz="1800" b="1" dirty="0">
               <a:solidFill>
                 <a:schemeClr val="tx1">
                   <a:lumMod val="85000"/>
@@ -7854,7 +8396,7 @@
               </a:lnSpc>
             </a:pPr>
             <a:r>
-              <a:rPr lang="zh-CN" altLang="en-US" sz="1900" b="1" dirty="0">
+              <a:rPr lang="zh-CN" altLang="en-US" sz="1600" b="1" dirty="0">
                 <a:solidFill>
                   <a:schemeClr val="tx1">
                     <a:lumMod val="65000"/>
@@ -7866,7 +8408,7 @@
               </a:rPr>
               <a:t>开题：三项实验设计</a:t>
             </a:r>
-            <a:endParaRPr lang="en-US" altLang="zh-CN" sz="1900" b="1" dirty="0">
+            <a:endParaRPr lang="en-US" altLang="zh-CN" sz="1600" b="1" dirty="0">
               <a:solidFill>
                 <a:schemeClr val="tx1">
                   <a:lumMod val="65000"/>
@@ -7884,7 +8426,7 @@
               </a:lnSpc>
             </a:pPr>
             <a:r>
-              <a:rPr lang="zh-CN" altLang="en-US" sz="1900" b="1" dirty="0">
+              <a:rPr lang="zh-CN" altLang="en-US" sz="1600" b="1" dirty="0">
                 <a:solidFill>
                   <a:schemeClr val="tx1">
                     <a:lumMod val="65000"/>
@@ -7897,7 +8439,7 @@
               <a:t>实验</a:t>
             </a:r>
             <a:r>
-              <a:rPr lang="en-US" altLang="zh-CN" sz="1900" b="1" dirty="0">
+              <a:rPr lang="en-US" altLang="zh-CN" sz="1600" b="1" dirty="0">
                 <a:solidFill>
                   <a:schemeClr val="tx1">
                     <a:lumMod val="65000"/>
@@ -7910,7 +8452,7 @@
               <a:t>1</a:t>
             </a:r>
             <a:r>
-              <a:rPr lang="zh-CN" altLang="en-US" sz="1900" b="1" dirty="0">
+              <a:rPr lang="zh-CN" altLang="en-US" sz="1600" b="1" dirty="0">
                 <a:solidFill>
                   <a:schemeClr val="tx1">
                     <a:lumMod val="65000"/>
@@ -7923,7 +8465,7 @@
               <a:t>：程序编写、数据收集 </a:t>
             </a:r>
             <a:r>
-              <a:rPr lang="en-US" altLang="zh-CN" sz="1900" b="1" dirty="0">
+              <a:rPr lang="en-US" altLang="zh-CN" sz="1600" b="1" dirty="0">
                 <a:solidFill>
                   <a:schemeClr val="tx1">
                     <a:lumMod val="65000"/>
@@ -7936,7 +8478,7 @@
               <a:t>&amp; </a:t>
             </a:r>
             <a:r>
-              <a:rPr lang="zh-CN" altLang="en-US" sz="1900" b="1" dirty="0">
+              <a:rPr lang="zh-CN" altLang="en-US" sz="1600" b="1" dirty="0">
                 <a:solidFill>
                   <a:schemeClr val="tx1">
                     <a:lumMod val="65000"/>
@@ -7956,7 +8498,7 @@
               </a:lnSpc>
             </a:pPr>
             <a:r>
-              <a:rPr lang="zh-CN" altLang="en-US" sz="1900" b="1" dirty="0">
+              <a:rPr lang="zh-CN" altLang="en-US" sz="1600" b="1" dirty="0">
                 <a:solidFill>
                   <a:schemeClr val="tx1">
                     <a:lumMod val="65000"/>
@@ -7969,7 +8511,7 @@
               <a:t>实验</a:t>
             </a:r>
             <a:r>
-              <a:rPr lang="en-US" altLang="zh-CN" sz="1900" b="1" dirty="0">
+              <a:rPr lang="en-US" altLang="zh-CN" sz="1600" b="1" dirty="0">
                 <a:solidFill>
                   <a:schemeClr val="tx1">
                     <a:lumMod val="65000"/>
@@ -7982,7 +8524,7 @@
               <a:t>2</a:t>
             </a:r>
             <a:r>
-              <a:rPr lang="zh-CN" altLang="en-US" sz="1900" b="1" dirty="0">
+              <a:rPr lang="zh-CN" altLang="en-US" sz="1600" b="1" dirty="0">
                 <a:solidFill>
                   <a:schemeClr val="tx1">
                     <a:lumMod val="65000"/>
@@ -7995,7 +8537,7 @@
               <a:t>：程序编写 </a:t>
             </a:r>
             <a:r>
-              <a:rPr lang="en-US" altLang="zh-CN" sz="1900" b="1" dirty="0">
+              <a:rPr lang="en-US" altLang="zh-CN" sz="1600" b="1" dirty="0">
                 <a:solidFill>
                   <a:schemeClr val="tx1">
                     <a:lumMod val="65000"/>
@@ -8008,7 +8550,7 @@
               <a:t>&amp; </a:t>
             </a:r>
             <a:r>
-              <a:rPr lang="zh-CN" altLang="en-US" sz="1900" b="1" dirty="0">
+              <a:rPr lang="zh-CN" altLang="en-US" sz="1600" b="1" dirty="0">
                 <a:solidFill>
                   <a:schemeClr val="tx1">
                     <a:lumMod val="65000"/>
@@ -8020,11 +8562,11 @@
               </a:rPr>
               <a:t>预实验</a:t>
             </a:r>
-            <a:endParaRPr lang="en-US" altLang="zh-CN" sz="1800" b="1" dirty="0">
+            <a:endParaRPr lang="en-US" altLang="zh-CN" sz="1600" b="1" dirty="0">
               <a:solidFill>
                 <a:schemeClr val="tx1">
-                  <a:lumMod val="75000"/>
-                  <a:lumOff val="25000"/>
+                  <a:lumMod val="65000"/>
+                  <a:lumOff val="35000"/>
                 </a:schemeClr>
               </a:solidFill>
               <a:latin typeface="宋体" panose="02010600030101010101" pitchFamily="2" charset="-122"/>
@@ -8032,13 +8574,13 @@
             </a:endParaRPr>
           </a:p>
           <a:p>
-            <a:pPr>
+            <a:pPr marL="342900" indent="-342900">
               <a:lnSpc>
                 <a:spcPct val="150000"/>
               </a:lnSpc>
             </a:pPr>
             <a:r>
-              <a:rPr lang="zh-CN" altLang="en-US" sz="2400" b="1" dirty="0">
+              <a:rPr lang="zh-CN" altLang="en-US" sz="1800" b="1" dirty="0">
                 <a:solidFill>
                   <a:schemeClr val="tx1">
                     <a:lumMod val="85000"/>
@@ -8050,7 +8592,7 @@
               </a:rPr>
               <a:t>本学期进展：</a:t>
             </a:r>
-            <a:endParaRPr lang="en-US" altLang="zh-CN" sz="2000" b="1" dirty="0">
+            <a:endParaRPr lang="en-US" altLang="zh-CN" sz="1600" b="1" dirty="0">
               <a:solidFill>
                 <a:schemeClr val="tx1">
                   <a:lumMod val="85000"/>
@@ -8062,13 +8604,13 @@
             </a:endParaRPr>
           </a:p>
           <a:p>
-            <a:pPr lvl="1">
+            <a:pPr marL="800100" lvl="1" indent="-342900">
               <a:lnSpc>
                 <a:spcPct val="150000"/>
               </a:lnSpc>
             </a:pPr>
             <a:r>
-              <a:rPr lang="zh-CN" altLang="en-US" sz="1900" b="1" dirty="0">
+              <a:rPr lang="zh-CN" altLang="en-US" sz="1600" b="1" dirty="0">
                 <a:solidFill>
                   <a:schemeClr val="tx1">
                     <a:lumMod val="65000"/>
@@ -8080,7 +8622,7 @@
               </a:rPr>
               <a:t>预注册报告</a:t>
             </a:r>
-            <a:endParaRPr lang="en-US" altLang="zh-CN" sz="1900" b="1" dirty="0">
+            <a:endParaRPr lang="en-US" altLang="zh-CN" sz="1600" b="1" dirty="0">
               <a:solidFill>
                 <a:schemeClr val="tx1">
                   <a:lumMod val="65000"/>
@@ -8092,13 +8634,13 @@
             </a:endParaRPr>
           </a:p>
           <a:p>
-            <a:pPr lvl="1">
+            <a:pPr marL="800100" lvl="1" indent="-342900">
               <a:lnSpc>
                 <a:spcPct val="150000"/>
               </a:lnSpc>
             </a:pPr>
             <a:r>
-              <a:rPr lang="zh-CN" altLang="en-US" sz="1900" b="1" dirty="0">
+              <a:rPr lang="zh-CN" altLang="en-US" sz="1600" b="1" dirty="0">
                 <a:solidFill>
                   <a:schemeClr val="tx1">
                     <a:lumMod val="65000"/>
@@ -8111,7 +8653,7 @@
               <a:t>实验</a:t>
             </a:r>
             <a:r>
-              <a:rPr lang="en-US" altLang="zh-CN" sz="1900" b="1" dirty="0">
+              <a:rPr lang="en-US" altLang="zh-CN" sz="1600" b="1" dirty="0">
                 <a:solidFill>
                   <a:schemeClr val="tx1">
                     <a:lumMod val="65000"/>
@@ -8124,7 +8666,7 @@
               <a:t>1</a:t>
             </a:r>
             <a:r>
-              <a:rPr lang="zh-CN" altLang="en-US" sz="1900" b="1" dirty="0">
+              <a:rPr lang="zh-CN" altLang="en-US" sz="1600" b="1" dirty="0">
                 <a:solidFill>
                   <a:schemeClr val="tx1">
                     <a:lumMod val="65000"/>
@@ -8136,7 +8678,7 @@
               </a:rPr>
               <a:t>：结果撰写</a:t>
             </a:r>
-            <a:endParaRPr lang="en-US" altLang="zh-CN" sz="1900" b="1" dirty="0">
+            <a:endParaRPr lang="en-US" altLang="zh-CN" sz="1600" b="1" dirty="0">
               <a:solidFill>
                 <a:schemeClr val="tx1">
                   <a:lumMod val="65000"/>
@@ -8148,13 +8690,13 @@
             </a:endParaRPr>
           </a:p>
           <a:p>
-            <a:pPr lvl="1">
+            <a:pPr marL="800100" lvl="1" indent="-342900">
               <a:lnSpc>
                 <a:spcPct val="150000"/>
               </a:lnSpc>
             </a:pPr>
             <a:r>
-              <a:rPr lang="zh-CN" altLang="en-US" sz="1900" b="1" dirty="0">
+              <a:rPr lang="zh-CN" altLang="en-US" sz="1600" b="1" dirty="0">
                 <a:solidFill>
                   <a:schemeClr val="tx1">
                     <a:lumMod val="65000"/>
@@ -8167,7 +8709,7 @@
               <a:t>实验</a:t>
             </a:r>
             <a:r>
-              <a:rPr lang="en-US" altLang="zh-CN" sz="1900" b="1" dirty="0">
+              <a:rPr lang="en-US" altLang="zh-CN" sz="1600" b="1" dirty="0">
                 <a:solidFill>
                   <a:schemeClr val="tx1">
                     <a:lumMod val="65000"/>
@@ -8180,7 +8722,7 @@
               <a:t>2</a:t>
             </a:r>
             <a:r>
-              <a:rPr lang="zh-CN" altLang="en-US" sz="1900" b="1" dirty="0">
+              <a:rPr lang="zh-CN" altLang="en-US" sz="1600" b="1" dirty="0">
                 <a:solidFill>
                   <a:schemeClr val="tx1">
                     <a:lumMod val="65000"/>
@@ -8192,7 +8734,7 @@
               </a:rPr>
               <a:t>：数据收集、数据分析、结果撰写</a:t>
             </a:r>
-            <a:endParaRPr lang="en-US" altLang="zh-CN" sz="1900" b="1" dirty="0">
+            <a:endParaRPr lang="en-US" altLang="zh-CN" sz="1600" b="1" dirty="0">
               <a:solidFill>
                 <a:schemeClr val="tx1">
                   <a:lumMod val="65000"/>
@@ -8204,13 +8746,13 @@
             </a:endParaRPr>
           </a:p>
           <a:p>
-            <a:pPr lvl="1">
+            <a:pPr marL="800100" lvl="1" indent="-342900">
               <a:lnSpc>
                 <a:spcPct val="150000"/>
               </a:lnSpc>
             </a:pPr>
             <a:r>
-              <a:rPr lang="zh-CN" altLang="en-US" sz="1900" b="1" dirty="0">
+              <a:rPr lang="zh-CN" altLang="en-US" sz="1600" b="1" dirty="0">
                 <a:solidFill>
                   <a:schemeClr val="tx1">
                     <a:lumMod val="65000"/>
@@ -8223,7 +8765,7 @@
               <a:t>实验</a:t>
             </a:r>
             <a:r>
-              <a:rPr lang="en-US" altLang="zh-CN" sz="1900" b="1" dirty="0">
+              <a:rPr lang="en-US" altLang="zh-CN" sz="1600" b="1" dirty="0">
                 <a:solidFill>
                   <a:schemeClr val="tx1">
                     <a:lumMod val="65000"/>
@@ -8236,7 +8778,7 @@
               <a:t>3</a:t>
             </a:r>
             <a:r>
-              <a:rPr lang="zh-CN" altLang="en-US" sz="1900" b="1" dirty="0">
+              <a:rPr lang="zh-CN" altLang="en-US" sz="1600" b="1" dirty="0">
                 <a:solidFill>
                   <a:schemeClr val="tx1">
                     <a:lumMod val="65000"/>
@@ -8246,9 +8788,9 @@
                 <a:latin typeface="宋体" panose="02010600030101010101" pitchFamily="2" charset="-122"/>
                 <a:ea typeface="宋体" panose="02010600030101010101" pitchFamily="2" charset="-122"/>
               </a:rPr>
-              <a:t>：程序编写、预实验、数据收集、数据分析</a:t>
-            </a:r>
-            <a:endParaRPr lang="en-US" altLang="zh-CN" sz="1900" b="1" dirty="0">
+              <a:t>：程序编写、预实验、数据收集</a:t>
+            </a:r>
+            <a:endParaRPr lang="en-US" altLang="zh-CN" sz="1600" b="1" dirty="0">
               <a:solidFill>
                 <a:schemeClr val="tx1">
                   <a:lumMod val="65000"/>
@@ -8260,13 +8802,13 @@
             </a:endParaRPr>
           </a:p>
           <a:p>
-            <a:pPr>
+            <a:pPr marL="342900" indent="-342900">
               <a:lnSpc>
                 <a:spcPct val="150000"/>
               </a:lnSpc>
             </a:pPr>
             <a:r>
-              <a:rPr lang="en-US" altLang="zh-CN" sz="2000" b="1" dirty="0">
+              <a:rPr lang="en-US" altLang="zh-CN" sz="1600" b="1" dirty="0">
                 <a:solidFill>
                   <a:schemeClr val="tx1">
                     <a:lumMod val="85000"/>
@@ -8279,7 +8821,7 @@
               <a:t>TO DO</a:t>
             </a:r>
             <a:r>
-              <a:rPr lang="zh-CN" altLang="en-US" sz="2000" b="1" dirty="0">
+              <a:rPr lang="zh-CN" altLang="en-US" sz="1600" b="1" dirty="0">
                 <a:solidFill>
                   <a:schemeClr val="tx1">
                     <a:lumMod val="85000"/>
@@ -8291,7 +8833,7 @@
               </a:rPr>
               <a:t>：</a:t>
             </a:r>
-            <a:endParaRPr lang="en-US" altLang="zh-CN" sz="2000" b="1" dirty="0">
+            <a:endParaRPr lang="en-US" altLang="zh-CN" sz="1600" b="1" dirty="0">
               <a:solidFill>
                 <a:schemeClr val="tx1">
                   <a:lumMod val="85000"/>
@@ -8303,13 +8845,13 @@
             </a:endParaRPr>
           </a:p>
           <a:p>
-            <a:pPr lvl="1">
+            <a:pPr marL="800100" lvl="1" indent="-342900">
               <a:lnSpc>
                 <a:spcPct val="150000"/>
               </a:lnSpc>
             </a:pPr>
             <a:r>
-              <a:rPr lang="zh-CN" altLang="en-US" sz="1900" b="1" dirty="0">
+              <a:rPr lang="zh-CN" altLang="en-US" sz="1600" b="1" dirty="0">
                 <a:solidFill>
                   <a:schemeClr val="tx1">
                     <a:lumMod val="65000"/>
@@ -8319,9 +8861,35 @@
                 <a:latin typeface="宋体" panose="02010600030101010101" pitchFamily="2" charset="-122"/>
                 <a:ea typeface="宋体" panose="02010600030101010101" pitchFamily="2" charset="-122"/>
               </a:rPr>
-              <a:t>毕业论文撰写</a:t>
-            </a:r>
-            <a:endParaRPr lang="en-US" altLang="zh-CN" sz="1900" b="1" dirty="0">
+              <a:t>实验</a:t>
+            </a:r>
+            <a:r>
+              <a:rPr lang="en-US" altLang="zh-CN" sz="1600" b="1" dirty="0">
+                <a:solidFill>
+                  <a:schemeClr val="tx1">
+                    <a:lumMod val="65000"/>
+                    <a:lumOff val="35000"/>
+                  </a:schemeClr>
+                </a:solidFill>
+                <a:latin typeface="宋体" panose="02010600030101010101" pitchFamily="2" charset="-122"/>
+                <a:ea typeface="宋体" panose="02010600030101010101" pitchFamily="2" charset="-122"/>
+              </a:rPr>
+              <a:t>3</a:t>
+            </a:r>
+            <a:r>
+              <a:rPr lang="zh-CN" altLang="en-US" sz="1600" b="1" dirty="0">
+                <a:solidFill>
+                  <a:schemeClr val="tx1">
+                    <a:lumMod val="65000"/>
+                    <a:lumOff val="35000"/>
+                  </a:schemeClr>
+                </a:solidFill>
+                <a:latin typeface="宋体" panose="02010600030101010101" pitchFamily="2" charset="-122"/>
+                <a:ea typeface="宋体" panose="02010600030101010101" pitchFamily="2" charset="-122"/>
+              </a:rPr>
+              <a:t>：数据分析、结果撰写</a:t>
+            </a:r>
+            <a:endParaRPr lang="en-US" altLang="zh-CN" sz="1600" b="1" dirty="0">
               <a:solidFill>
                 <a:schemeClr val="tx1">
                   <a:lumMod val="65000"/>
@@ -8333,41 +8901,785 @@
             </a:endParaRPr>
           </a:p>
           <a:p>
-            <a:pPr>
+            <a:pPr marL="800100" lvl="1" indent="-342900">
               <a:lnSpc>
                 <a:spcPct val="150000"/>
               </a:lnSpc>
             </a:pPr>
+            <a:r>
+              <a:rPr lang="zh-CN" altLang="en-US" sz="1600" b="1" dirty="0">
+                <a:solidFill>
+                  <a:schemeClr val="tx1">
+                    <a:lumMod val="65000"/>
+                    <a:lumOff val="35000"/>
+                  </a:schemeClr>
+                </a:solidFill>
+                <a:latin typeface="宋体" panose="02010600030101010101" pitchFamily="2" charset="-122"/>
+                <a:ea typeface="宋体" panose="02010600030101010101" pitchFamily="2" charset="-122"/>
+              </a:rPr>
+              <a:t>论文初稿撰写</a:t>
+            </a:r>
             <a:endParaRPr lang="en-US" altLang="zh-CN" sz="1800" b="1" dirty="0">
               <a:solidFill>
                 <a:schemeClr val="tx1">
-                  <a:lumMod val="85000"/>
-                  <a:lumOff val="15000"/>
+                  <a:lumMod val="65000"/>
+                  <a:lumOff val="35000"/>
                 </a:schemeClr>
               </a:solidFill>
               <a:latin typeface="宋体" panose="02010600030101010101" pitchFamily="2" charset="-122"/>
               <a:ea typeface="宋体" panose="02010600030101010101" pitchFamily="2" charset="-122"/>
             </a:endParaRPr>
           </a:p>
-          <a:p>
-            <a:pPr>
-              <a:lnSpc>
-                <a:spcPct val="150000"/>
-              </a:lnSpc>
-            </a:pPr>
-            <a:endParaRPr lang="zh-CN" altLang="en-US" sz="2300" b="1" dirty="0">
-              <a:solidFill>
-                <a:schemeClr val="tx1">
-                  <a:lumMod val="75000"/>
-                  <a:lumOff val="25000"/>
-                </a:schemeClr>
-              </a:solidFill>
-              <a:latin typeface="宋体" panose="02010600030101010101" pitchFamily="2" charset="-122"/>
-              <a:ea typeface="宋体" panose="02010600030101010101" pitchFamily="2" charset="-122"/>
-            </a:endParaRPr>
-          </a:p>
-        </p:txBody>
-      </p:sp>
+        </p:txBody>
+      </p:sp>
+      <p:grpSp>
+        <p:nvGrpSpPr>
+          <p:cNvPr id="26" name="组合 25">
+            <a:extLst>
+              <a:ext uri="{FF2B5EF4-FFF2-40B4-BE49-F238E27FC236}">
+                <a16:creationId xmlns:a16="http://schemas.microsoft.com/office/drawing/2014/main" id="{6EACB694-FCFF-3957-3AAE-67EC7D6622C3}"/>
+              </a:ext>
+            </a:extLst>
+          </p:cNvPr>
+          <p:cNvGrpSpPr/>
+          <p:nvPr/>
+        </p:nvGrpSpPr>
+        <p:grpSpPr>
+          <a:xfrm>
+            <a:off x="5198658" y="802533"/>
+            <a:ext cx="6542295" cy="2246106"/>
+            <a:chOff x="5198658" y="802533"/>
+            <a:chExt cx="6542295" cy="2246106"/>
+          </a:xfrm>
+        </p:grpSpPr>
+        <p:grpSp>
+          <p:nvGrpSpPr>
+            <p:cNvPr id="8" name="组合 7">
+              <a:extLst>
+                <a:ext uri="{FF2B5EF4-FFF2-40B4-BE49-F238E27FC236}">
+                  <a16:creationId xmlns:a16="http://schemas.microsoft.com/office/drawing/2014/main" id="{606D02A1-8622-0BB2-5D72-56D3B604381F}"/>
+                </a:ext>
+              </a:extLst>
+            </p:cNvPr>
+            <p:cNvGrpSpPr/>
+            <p:nvPr/>
+          </p:nvGrpSpPr>
+          <p:grpSpPr>
+            <a:xfrm>
+              <a:off x="5198658" y="802533"/>
+              <a:ext cx="6542295" cy="1993704"/>
+              <a:chOff x="4547353" y="498960"/>
+              <a:chExt cx="7295032" cy="2223094"/>
+            </a:xfrm>
+          </p:grpSpPr>
+          <p:pic>
+            <p:nvPicPr>
+              <p:cNvPr id="5" name="图片 4">
+                <a:extLst>
+                  <a:ext uri="{FF2B5EF4-FFF2-40B4-BE49-F238E27FC236}">
+                    <a16:creationId xmlns:a16="http://schemas.microsoft.com/office/drawing/2014/main" id="{8BF3341C-D236-9514-5F1B-F8528B75D996}"/>
+                  </a:ext>
+                </a:extLst>
+              </p:cNvPr>
+              <p:cNvPicPr>
+                <a:picLocks noChangeAspect="1"/>
+              </p:cNvPicPr>
+              <p:nvPr/>
+            </p:nvPicPr>
+            <p:blipFill>
+              <a:blip r:embed="rId3">
+                <a:extLst>
+                  <a:ext uri="{28A0092B-C50C-407E-A947-70E740481C1C}">
+                    <a14:useLocalDpi xmlns:a14="http://schemas.microsoft.com/office/drawing/2010/main" val="0"/>
+                  </a:ext>
+                </a:extLst>
+              </a:blip>
+              <a:stretch>
+                <a:fillRect/>
+              </a:stretch>
+            </p:blipFill>
+            <p:spPr>
+              <a:xfrm>
+                <a:off x="8242385" y="498961"/>
+                <a:ext cx="3600000" cy="2223093"/>
+              </a:xfrm>
+              <a:prstGeom prst="rect">
+                <a:avLst/>
+              </a:prstGeom>
+            </p:spPr>
+          </p:pic>
+          <p:pic>
+            <p:nvPicPr>
+              <p:cNvPr id="7" name="图片 6">
+                <a:extLst>
+                  <a:ext uri="{FF2B5EF4-FFF2-40B4-BE49-F238E27FC236}">
+                    <a16:creationId xmlns:a16="http://schemas.microsoft.com/office/drawing/2014/main" id="{77171AD5-0D1D-51CA-30F7-A820C8233A82}"/>
+                  </a:ext>
+                </a:extLst>
+              </p:cNvPr>
+              <p:cNvPicPr>
+                <a:picLocks noChangeAspect="1"/>
+              </p:cNvPicPr>
+              <p:nvPr/>
+            </p:nvPicPr>
+            <p:blipFill>
+              <a:blip r:embed="rId4">
+                <a:extLst>
+                  <a:ext uri="{28A0092B-C50C-407E-A947-70E740481C1C}">
+                    <a14:useLocalDpi xmlns:a14="http://schemas.microsoft.com/office/drawing/2010/main" val="0"/>
+                  </a:ext>
+                </a:extLst>
+              </a:blip>
+              <a:stretch>
+                <a:fillRect/>
+              </a:stretch>
+            </p:blipFill>
+            <p:spPr>
+              <a:xfrm>
+                <a:off x="4547353" y="498960"/>
+                <a:ext cx="3600000" cy="2223093"/>
+              </a:xfrm>
+              <a:prstGeom prst="rect">
+                <a:avLst/>
+              </a:prstGeom>
+            </p:spPr>
+          </p:pic>
+        </p:grpSp>
+        <p:sp>
+          <p:nvSpPr>
+            <p:cNvPr id="23" name="文本框 22">
+              <a:extLst>
+                <a:ext uri="{FF2B5EF4-FFF2-40B4-BE49-F238E27FC236}">
+                  <a16:creationId xmlns:a16="http://schemas.microsoft.com/office/drawing/2014/main" id="{2EE2C2A7-FAE5-92AA-F0BD-1623583A9A07}"/>
+                </a:ext>
+              </a:extLst>
+            </p:cNvPr>
+            <p:cNvSpPr txBox="1"/>
+            <p:nvPr/>
+          </p:nvSpPr>
+          <p:spPr>
+            <a:xfrm>
+              <a:off x="7830883" y="2710085"/>
+              <a:ext cx="1104900" cy="338554"/>
+            </a:xfrm>
+            <a:prstGeom prst="rect">
+              <a:avLst/>
+            </a:prstGeom>
+            <a:noFill/>
+          </p:spPr>
+          <p:txBody>
+            <a:bodyPr wrap="square" rtlCol="0">
+              <a:spAutoFit/>
+            </a:bodyPr>
+            <a:lstStyle/>
+            <a:p>
+              <a:r>
+                <a:rPr lang="zh-CN" altLang="en-US" sz="1600" dirty="0">
+                  <a:solidFill>
+                    <a:schemeClr val="tx1">
+                      <a:lumMod val="65000"/>
+                      <a:lumOff val="35000"/>
+                    </a:schemeClr>
+                  </a:solidFill>
+                  <a:latin typeface="宋体" panose="02010600030101010101" pitchFamily="2" charset="-122"/>
+                  <a:ea typeface="宋体" panose="02010600030101010101" pitchFamily="2" charset="-122"/>
+                </a:rPr>
+                <a:t>实验</a:t>
+              </a:r>
+              <a:r>
+                <a:rPr lang="en-US" altLang="zh-CN" sz="1600" dirty="0">
+                  <a:solidFill>
+                    <a:schemeClr val="tx1">
+                      <a:lumMod val="65000"/>
+                      <a:lumOff val="35000"/>
+                    </a:schemeClr>
+                  </a:solidFill>
+                  <a:latin typeface="宋体" panose="02010600030101010101" pitchFamily="2" charset="-122"/>
+                  <a:ea typeface="宋体" panose="02010600030101010101" pitchFamily="2" charset="-122"/>
+                </a:rPr>
+                <a:t>1</a:t>
+              </a:r>
+              <a:r>
+                <a:rPr lang="zh-CN" altLang="en-US" sz="1600" dirty="0">
+                  <a:solidFill>
+                    <a:schemeClr val="tx1">
+                      <a:lumMod val="65000"/>
+                      <a:lumOff val="35000"/>
+                    </a:schemeClr>
+                  </a:solidFill>
+                  <a:latin typeface="宋体" panose="02010600030101010101" pitchFamily="2" charset="-122"/>
+                  <a:ea typeface="宋体" panose="02010600030101010101" pitchFamily="2" charset="-122"/>
+                </a:rPr>
+                <a:t>结果</a:t>
+              </a:r>
+            </a:p>
+          </p:txBody>
+        </p:sp>
+      </p:grpSp>
+      <p:grpSp>
+        <p:nvGrpSpPr>
+          <p:cNvPr id="25" name="组合 24">
+            <a:extLst>
+              <a:ext uri="{FF2B5EF4-FFF2-40B4-BE49-F238E27FC236}">
+                <a16:creationId xmlns:a16="http://schemas.microsoft.com/office/drawing/2014/main" id="{674CA624-E69D-BBBD-FE72-01CAF61893B1}"/>
+              </a:ext>
+            </a:extLst>
+          </p:cNvPr>
+          <p:cNvGrpSpPr/>
+          <p:nvPr/>
+        </p:nvGrpSpPr>
+        <p:grpSpPr>
+          <a:xfrm>
+            <a:off x="5900842" y="3094768"/>
+            <a:ext cx="6222578" cy="3724535"/>
+            <a:chOff x="5900842" y="3094768"/>
+            <a:chExt cx="6222578" cy="3724535"/>
+          </a:xfrm>
+        </p:grpSpPr>
+        <p:grpSp>
+          <p:nvGrpSpPr>
+            <p:cNvPr id="10" name="组合 9">
+              <a:extLst>
+                <a:ext uri="{FF2B5EF4-FFF2-40B4-BE49-F238E27FC236}">
+                  <a16:creationId xmlns:a16="http://schemas.microsoft.com/office/drawing/2014/main" id="{45DFFBBA-DF43-9A92-8952-475A91BC0CD0}"/>
+                </a:ext>
+              </a:extLst>
+            </p:cNvPr>
+            <p:cNvGrpSpPr>
+              <a:grpSpLocks noChangeAspect="1"/>
+            </p:cNvGrpSpPr>
+            <p:nvPr/>
+          </p:nvGrpSpPr>
+          <p:grpSpPr>
+            <a:xfrm>
+              <a:off x="5900842" y="3094768"/>
+              <a:ext cx="4964982" cy="3385980"/>
+              <a:chOff x="524546" y="180179"/>
+              <a:chExt cx="9666653" cy="6592389"/>
+            </a:xfrm>
+          </p:grpSpPr>
+          <p:pic>
+            <p:nvPicPr>
+              <p:cNvPr id="11" name="图片 10">
+                <a:extLst>
+                  <a:ext uri="{FF2B5EF4-FFF2-40B4-BE49-F238E27FC236}">
+                    <a16:creationId xmlns:a16="http://schemas.microsoft.com/office/drawing/2014/main" id="{3F70DBA7-C27E-EBAC-B6DA-A4E03540ED96}"/>
+                  </a:ext>
+                </a:extLst>
+              </p:cNvPr>
+              <p:cNvPicPr>
+                <a:picLocks noChangeAspect="1"/>
+              </p:cNvPicPr>
+              <p:nvPr/>
+            </p:nvPicPr>
+            <p:blipFill>
+              <a:blip r:embed="rId5">
+                <a:extLst>
+                  <a:ext uri="{28A0092B-C50C-407E-A947-70E740481C1C}">
+                    <a14:useLocalDpi xmlns:a14="http://schemas.microsoft.com/office/drawing/2010/main" val="0"/>
+                  </a:ext>
+                </a:extLst>
+              </a:blip>
+              <a:stretch>
+                <a:fillRect/>
+              </a:stretch>
+            </p:blipFill>
+            <p:spPr>
+              <a:xfrm>
+                <a:off x="5367318" y="535450"/>
+                <a:ext cx="4788000" cy="2956715"/>
+              </a:xfrm>
+              <a:prstGeom prst="rect">
+                <a:avLst/>
+              </a:prstGeom>
+            </p:spPr>
+          </p:pic>
+          <p:pic>
+            <p:nvPicPr>
+              <p:cNvPr id="12" name="图片 11">
+                <a:extLst>
+                  <a:ext uri="{FF2B5EF4-FFF2-40B4-BE49-F238E27FC236}">
+                    <a16:creationId xmlns:a16="http://schemas.microsoft.com/office/drawing/2014/main" id="{507F626E-9AAC-43D9-28F2-58519A9A141D}"/>
+                  </a:ext>
+                </a:extLst>
+              </p:cNvPr>
+              <p:cNvPicPr>
+                <a:picLocks noChangeAspect="1"/>
+              </p:cNvPicPr>
+              <p:nvPr/>
+            </p:nvPicPr>
+            <p:blipFill>
+              <a:blip r:embed="rId6">
+                <a:extLst>
+                  <a:ext uri="{28A0092B-C50C-407E-A947-70E740481C1C}">
+                    <a14:useLocalDpi xmlns:a14="http://schemas.microsoft.com/office/drawing/2010/main" val="0"/>
+                  </a:ext>
+                </a:extLst>
+              </a:blip>
+              <a:stretch>
+                <a:fillRect/>
+              </a:stretch>
+            </p:blipFill>
+            <p:spPr>
+              <a:xfrm>
+                <a:off x="545932" y="535450"/>
+                <a:ext cx="4788000" cy="2956715"/>
+              </a:xfrm>
+              <a:prstGeom prst="rect">
+                <a:avLst/>
+              </a:prstGeom>
+            </p:spPr>
+          </p:pic>
+          <p:grpSp>
+            <p:nvGrpSpPr>
+              <p:cNvPr id="13" name="组合 12">
+                <a:extLst>
+                  <a:ext uri="{FF2B5EF4-FFF2-40B4-BE49-F238E27FC236}">
+                    <a16:creationId xmlns:a16="http://schemas.microsoft.com/office/drawing/2014/main" id="{2E037369-7B41-BE6C-908E-C7E5D58AA2C8}"/>
+                  </a:ext>
+                </a:extLst>
+              </p:cNvPr>
+              <p:cNvGrpSpPr>
+                <a:grpSpLocks noChangeAspect="1"/>
+              </p:cNvGrpSpPr>
+              <p:nvPr/>
+            </p:nvGrpSpPr>
+            <p:grpSpPr>
+              <a:xfrm>
+                <a:off x="579319" y="180179"/>
+                <a:ext cx="5051116" cy="599232"/>
+                <a:chOff x="551384" y="1052736"/>
+                <a:chExt cx="5688632" cy="674863"/>
+              </a:xfrm>
+            </p:grpSpPr>
+            <p:sp>
+              <p:nvSpPr>
+                <p:cNvPr id="19" name="文本框 18">
+                  <a:extLst>
+                    <a:ext uri="{FF2B5EF4-FFF2-40B4-BE49-F238E27FC236}">
+                      <a16:creationId xmlns:a16="http://schemas.microsoft.com/office/drawing/2014/main" id="{2831730D-B79C-8159-5C3B-F6B21F36099A}"/>
+                    </a:ext>
+                  </a:extLst>
+                </p:cNvPr>
+                <p:cNvSpPr txBox="1"/>
+                <p:nvPr/>
+              </p:nvSpPr>
+              <p:spPr>
+                <a:xfrm>
+                  <a:off x="551384" y="1052736"/>
+                  <a:ext cx="288631" cy="674863"/>
+                </a:xfrm>
+                <a:prstGeom prst="rect">
+                  <a:avLst/>
+                </a:prstGeom>
+                <a:noFill/>
+              </p:spPr>
+              <p:txBody>
+                <a:bodyPr wrap="square" rtlCol="0">
+                  <a:spAutoFit/>
+                </a:bodyPr>
+                <a:lstStyle/>
+                <a:p>
+                  <a:pPr algn="l"/>
+                  <a:r>
+                    <a:rPr lang="en-US" altLang="zh-CN" sz="1400" dirty="0">
+                      <a:latin typeface="微软雅黑" panose="020B0503020204020204" pitchFamily="34" charset="-122"/>
+                      <a:ea typeface="微软雅黑" panose="020B0503020204020204" pitchFamily="34" charset="-122"/>
+                    </a:rPr>
+                    <a:t>A</a:t>
+                  </a:r>
+                  <a:endParaRPr lang="zh-CN" altLang="en-US" sz="1400" dirty="0">
+                    <a:latin typeface="微软雅黑" panose="020B0503020204020204" pitchFamily="34" charset="-122"/>
+                    <a:ea typeface="微软雅黑" panose="020B0503020204020204" pitchFamily="34" charset="-122"/>
+                  </a:endParaRPr>
+                </a:p>
+              </p:txBody>
+            </p:sp>
+            <p:sp>
+              <p:nvSpPr>
+                <p:cNvPr id="20" name="文本框 19">
+                  <a:extLst>
+                    <a:ext uri="{FF2B5EF4-FFF2-40B4-BE49-F238E27FC236}">
+                      <a16:creationId xmlns:a16="http://schemas.microsoft.com/office/drawing/2014/main" id="{75FA04E8-0C55-F481-D609-07D9BE865F97}"/>
+                    </a:ext>
+                  </a:extLst>
+                </p:cNvPr>
+                <p:cNvSpPr txBox="1"/>
+                <p:nvPr/>
+              </p:nvSpPr>
+              <p:spPr>
+                <a:xfrm>
+                  <a:off x="5951385" y="1052736"/>
+                  <a:ext cx="288631" cy="674863"/>
+                </a:xfrm>
+                <a:prstGeom prst="rect">
+                  <a:avLst/>
+                </a:prstGeom>
+                <a:noFill/>
+              </p:spPr>
+              <p:txBody>
+                <a:bodyPr wrap="square" rtlCol="0">
+                  <a:spAutoFit/>
+                </a:bodyPr>
+                <a:lstStyle/>
+                <a:p>
+                  <a:pPr algn="l"/>
+                  <a:r>
+                    <a:rPr lang="en-US" altLang="zh-CN" sz="1400" dirty="0">
+                      <a:latin typeface="微软雅黑" panose="020B0503020204020204" pitchFamily="34" charset="-122"/>
+                      <a:ea typeface="微软雅黑" panose="020B0503020204020204" pitchFamily="34" charset="-122"/>
+                    </a:rPr>
+                    <a:t>B</a:t>
+                  </a:r>
+                  <a:endParaRPr lang="zh-CN" altLang="en-US" sz="1400" dirty="0">
+                    <a:latin typeface="微软雅黑" panose="020B0503020204020204" pitchFamily="34" charset="-122"/>
+                    <a:ea typeface="微软雅黑" panose="020B0503020204020204" pitchFamily="34" charset="-122"/>
+                  </a:endParaRPr>
+                </a:p>
+              </p:txBody>
+            </p:sp>
+          </p:grpSp>
+          <p:grpSp>
+            <p:nvGrpSpPr>
+              <p:cNvPr id="14" name="组合 13">
+                <a:extLst>
+                  <a:ext uri="{FF2B5EF4-FFF2-40B4-BE49-F238E27FC236}">
+                    <a16:creationId xmlns:a16="http://schemas.microsoft.com/office/drawing/2014/main" id="{2ACF017F-1C1B-32D7-CF2A-F7E9CA96D783}"/>
+                  </a:ext>
+                </a:extLst>
+              </p:cNvPr>
+              <p:cNvGrpSpPr>
+                <a:grpSpLocks noChangeAspect="1"/>
+              </p:cNvGrpSpPr>
+              <p:nvPr/>
+            </p:nvGrpSpPr>
+            <p:grpSpPr>
+              <a:xfrm>
+                <a:off x="524546" y="3176758"/>
+                <a:ext cx="5070238" cy="599231"/>
+                <a:chOff x="345382" y="760398"/>
+                <a:chExt cx="5710168" cy="674862"/>
+              </a:xfrm>
+            </p:grpSpPr>
+            <p:sp>
+              <p:nvSpPr>
+                <p:cNvPr id="17" name="文本框 16">
+                  <a:extLst>
+                    <a:ext uri="{FF2B5EF4-FFF2-40B4-BE49-F238E27FC236}">
+                      <a16:creationId xmlns:a16="http://schemas.microsoft.com/office/drawing/2014/main" id="{420BDEB0-3B4F-C54A-B40F-5683BA17A186}"/>
+                    </a:ext>
+                  </a:extLst>
+                </p:cNvPr>
+                <p:cNvSpPr txBox="1"/>
+                <p:nvPr/>
+              </p:nvSpPr>
+              <p:spPr>
+                <a:xfrm>
+                  <a:off x="345382" y="760398"/>
+                  <a:ext cx="288632" cy="674862"/>
+                </a:xfrm>
+                <a:prstGeom prst="rect">
+                  <a:avLst/>
+                </a:prstGeom>
+                <a:noFill/>
+              </p:spPr>
+              <p:txBody>
+                <a:bodyPr wrap="square" rtlCol="0">
+                  <a:spAutoFit/>
+                </a:bodyPr>
+                <a:lstStyle/>
+                <a:p>
+                  <a:pPr algn="l"/>
+                  <a:r>
+                    <a:rPr lang="en-US" altLang="zh-CN" sz="1400" dirty="0">
+                      <a:latin typeface="微软雅黑" panose="020B0503020204020204" pitchFamily="34" charset="-122"/>
+                      <a:ea typeface="微软雅黑" panose="020B0503020204020204" pitchFamily="34" charset="-122"/>
+                    </a:rPr>
+                    <a:t>C</a:t>
+                  </a:r>
+                  <a:endParaRPr lang="zh-CN" altLang="en-US" sz="1400" dirty="0">
+                    <a:latin typeface="微软雅黑" panose="020B0503020204020204" pitchFamily="34" charset="-122"/>
+                    <a:ea typeface="微软雅黑" panose="020B0503020204020204" pitchFamily="34" charset="-122"/>
+                  </a:endParaRPr>
+                </a:p>
+              </p:txBody>
+            </p:sp>
+            <p:sp>
+              <p:nvSpPr>
+                <p:cNvPr id="18" name="文本框 17">
+                  <a:extLst>
+                    <a:ext uri="{FF2B5EF4-FFF2-40B4-BE49-F238E27FC236}">
+                      <a16:creationId xmlns:a16="http://schemas.microsoft.com/office/drawing/2014/main" id="{AB382332-23C1-DDA4-0A10-ABA5F6481D83}"/>
+                    </a:ext>
+                  </a:extLst>
+                </p:cNvPr>
+                <p:cNvSpPr txBox="1"/>
+                <p:nvPr/>
+              </p:nvSpPr>
+              <p:spPr>
+                <a:xfrm>
+                  <a:off x="5766918" y="760398"/>
+                  <a:ext cx="288632" cy="674862"/>
+                </a:xfrm>
+                <a:prstGeom prst="rect">
+                  <a:avLst/>
+                </a:prstGeom>
+                <a:noFill/>
+              </p:spPr>
+              <p:txBody>
+                <a:bodyPr wrap="square" rtlCol="0">
+                  <a:spAutoFit/>
+                </a:bodyPr>
+                <a:lstStyle/>
+                <a:p>
+                  <a:pPr algn="l"/>
+                  <a:r>
+                    <a:rPr lang="en-US" altLang="zh-CN" sz="1400" dirty="0">
+                      <a:latin typeface="微软雅黑" panose="020B0503020204020204" pitchFamily="34" charset="-122"/>
+                      <a:ea typeface="微软雅黑" panose="020B0503020204020204" pitchFamily="34" charset="-122"/>
+                    </a:rPr>
+                    <a:t>D</a:t>
+                  </a:r>
+                  <a:endParaRPr lang="zh-CN" altLang="en-US" sz="1400" dirty="0">
+                    <a:latin typeface="微软雅黑" panose="020B0503020204020204" pitchFamily="34" charset="-122"/>
+                    <a:ea typeface="微软雅黑" panose="020B0503020204020204" pitchFamily="34" charset="-122"/>
+                  </a:endParaRPr>
+                </a:p>
+              </p:txBody>
+            </p:sp>
+          </p:grpSp>
+          <p:pic>
+            <p:nvPicPr>
+              <p:cNvPr id="15" name="图片 14">
+                <a:extLst>
+                  <a:ext uri="{FF2B5EF4-FFF2-40B4-BE49-F238E27FC236}">
+                    <a16:creationId xmlns:a16="http://schemas.microsoft.com/office/drawing/2014/main" id="{FFB57430-2845-8918-1D4B-686416A225D9}"/>
+                  </a:ext>
+                </a:extLst>
+              </p:cNvPr>
+              <p:cNvPicPr>
+                <a:picLocks noChangeAspect="1"/>
+              </p:cNvPicPr>
+              <p:nvPr/>
+            </p:nvPicPr>
+            <p:blipFill>
+              <a:blip r:embed="rId7">
+                <a:extLst>
+                  <a:ext uri="{28A0092B-C50C-407E-A947-70E740481C1C}">
+                    <a14:useLocalDpi xmlns:a14="http://schemas.microsoft.com/office/drawing/2010/main" val="0"/>
+                  </a:ext>
+                </a:extLst>
+              </a:blip>
+              <a:stretch>
+                <a:fillRect/>
+              </a:stretch>
+            </p:blipFill>
+            <p:spPr>
+              <a:xfrm>
+                <a:off x="5403200" y="3815852"/>
+                <a:ext cx="4787999" cy="2956716"/>
+              </a:xfrm>
+              <a:prstGeom prst="rect">
+                <a:avLst/>
+              </a:prstGeom>
+            </p:spPr>
+          </p:pic>
+          <p:pic>
+            <p:nvPicPr>
+              <p:cNvPr id="16" name="图片 15">
+                <a:extLst>
+                  <a:ext uri="{FF2B5EF4-FFF2-40B4-BE49-F238E27FC236}">
+                    <a16:creationId xmlns:a16="http://schemas.microsoft.com/office/drawing/2014/main" id="{2A51404D-93EB-4380-773A-04967FB51D62}"/>
+                  </a:ext>
+                </a:extLst>
+              </p:cNvPr>
+              <p:cNvPicPr>
+                <a:picLocks noChangeAspect="1"/>
+              </p:cNvPicPr>
+              <p:nvPr/>
+            </p:nvPicPr>
+            <p:blipFill>
+              <a:blip r:embed="rId8">
+                <a:extLst>
+                  <a:ext uri="{28A0092B-C50C-407E-A947-70E740481C1C}">
+                    <a14:useLocalDpi xmlns:a14="http://schemas.microsoft.com/office/drawing/2010/main" val="0"/>
+                  </a:ext>
+                </a:extLst>
+              </a:blip>
+              <a:stretch>
+                <a:fillRect/>
+              </a:stretch>
+            </p:blipFill>
+            <p:spPr>
+              <a:xfrm>
+                <a:off x="546714" y="3784271"/>
+                <a:ext cx="4788000" cy="2956715"/>
+              </a:xfrm>
+              <a:prstGeom prst="rect">
+                <a:avLst/>
+              </a:prstGeom>
+            </p:spPr>
+          </p:pic>
+        </p:grpSp>
+        <p:sp>
+          <p:nvSpPr>
+            <p:cNvPr id="21" name="文本框 20">
+              <a:extLst>
+                <a:ext uri="{FF2B5EF4-FFF2-40B4-BE49-F238E27FC236}">
+                  <a16:creationId xmlns:a16="http://schemas.microsoft.com/office/drawing/2014/main" id="{F0443202-E3BF-5F93-D528-6F7C30417DC1}"/>
+                </a:ext>
+              </a:extLst>
+            </p:cNvPr>
+            <p:cNvSpPr txBox="1"/>
+            <p:nvPr/>
+          </p:nvSpPr>
+          <p:spPr>
+            <a:xfrm>
+              <a:off x="11018520" y="3892487"/>
+              <a:ext cx="1104900" cy="338554"/>
+            </a:xfrm>
+            <a:prstGeom prst="rect">
+              <a:avLst/>
+            </a:prstGeom>
+            <a:noFill/>
+          </p:spPr>
+          <p:txBody>
+            <a:bodyPr wrap="square" rtlCol="0">
+              <a:spAutoFit/>
+            </a:bodyPr>
+            <a:lstStyle/>
+            <a:p>
+              <a:r>
+                <a:rPr lang="zh-CN" altLang="en-US" sz="1600" dirty="0">
+                  <a:solidFill>
+                    <a:schemeClr val="tx1">
+                      <a:lumMod val="65000"/>
+                      <a:lumOff val="35000"/>
+                    </a:schemeClr>
+                  </a:solidFill>
+                  <a:latin typeface="宋体" panose="02010600030101010101" pitchFamily="2" charset="-122"/>
+                  <a:ea typeface="宋体" panose="02010600030101010101" pitchFamily="2" charset="-122"/>
+                </a:rPr>
+                <a:t>任务有关</a:t>
+              </a:r>
+            </a:p>
+          </p:txBody>
+        </p:sp>
+        <p:sp>
+          <p:nvSpPr>
+            <p:cNvPr id="22" name="文本框 21">
+              <a:extLst>
+                <a:ext uri="{FF2B5EF4-FFF2-40B4-BE49-F238E27FC236}">
+                  <a16:creationId xmlns:a16="http://schemas.microsoft.com/office/drawing/2014/main" id="{4210DC34-F48C-0BE6-347F-FF5E9A751AE9}"/>
+                </a:ext>
+              </a:extLst>
+            </p:cNvPr>
+            <p:cNvSpPr txBox="1"/>
+            <p:nvPr/>
+          </p:nvSpPr>
+          <p:spPr>
+            <a:xfrm>
+              <a:off x="11018520" y="5611209"/>
+              <a:ext cx="1104900" cy="338554"/>
+            </a:xfrm>
+            <a:prstGeom prst="rect">
+              <a:avLst/>
+            </a:prstGeom>
+            <a:noFill/>
+          </p:spPr>
+          <p:txBody>
+            <a:bodyPr wrap="square" rtlCol="0">
+              <a:spAutoFit/>
+            </a:bodyPr>
+            <a:lstStyle/>
+            <a:p>
+              <a:r>
+                <a:rPr lang="zh-CN" altLang="en-US" sz="1600" dirty="0">
+                  <a:solidFill>
+                    <a:schemeClr val="tx1">
+                      <a:lumMod val="65000"/>
+                      <a:lumOff val="35000"/>
+                    </a:schemeClr>
+                  </a:solidFill>
+                  <a:latin typeface="宋体" panose="02010600030101010101" pitchFamily="2" charset="-122"/>
+                  <a:ea typeface="宋体" panose="02010600030101010101" pitchFamily="2" charset="-122"/>
+                </a:rPr>
+                <a:t>任务无关</a:t>
+              </a:r>
+            </a:p>
+          </p:txBody>
+        </p:sp>
+        <p:sp>
+          <p:nvSpPr>
+            <p:cNvPr id="24" name="文本框 23">
+              <a:extLst>
+                <a:ext uri="{FF2B5EF4-FFF2-40B4-BE49-F238E27FC236}">
+                  <a16:creationId xmlns:a16="http://schemas.microsoft.com/office/drawing/2014/main" id="{C3551E1B-D705-0BC6-1DD7-A9688125D184}"/>
+                </a:ext>
+              </a:extLst>
+            </p:cNvPr>
+            <p:cNvSpPr txBox="1"/>
+            <p:nvPr/>
+          </p:nvSpPr>
+          <p:spPr>
+            <a:xfrm>
+              <a:off x="7839243" y="6480749"/>
+              <a:ext cx="1104900" cy="338554"/>
+            </a:xfrm>
+            <a:prstGeom prst="rect">
+              <a:avLst/>
+            </a:prstGeom>
+            <a:noFill/>
+          </p:spPr>
+          <p:txBody>
+            <a:bodyPr wrap="square" rtlCol="0">
+              <a:spAutoFit/>
+            </a:bodyPr>
+            <a:lstStyle/>
+            <a:p>
+              <a:r>
+                <a:rPr lang="zh-CN" altLang="en-US" sz="1600" dirty="0">
+                  <a:solidFill>
+                    <a:schemeClr val="tx1">
+                      <a:lumMod val="65000"/>
+                      <a:lumOff val="35000"/>
+                    </a:schemeClr>
+                  </a:solidFill>
+                  <a:latin typeface="宋体" panose="02010600030101010101" pitchFamily="2" charset="-122"/>
+                  <a:ea typeface="宋体" panose="02010600030101010101" pitchFamily="2" charset="-122"/>
+                </a:rPr>
+                <a:t>实验</a:t>
+              </a:r>
+              <a:r>
+                <a:rPr lang="en-US" altLang="zh-CN" sz="1600" dirty="0">
+                  <a:solidFill>
+                    <a:schemeClr val="tx1">
+                      <a:lumMod val="65000"/>
+                      <a:lumOff val="35000"/>
+                    </a:schemeClr>
+                  </a:solidFill>
+                  <a:latin typeface="宋体" panose="02010600030101010101" pitchFamily="2" charset="-122"/>
+                  <a:ea typeface="宋体" panose="02010600030101010101" pitchFamily="2" charset="-122"/>
+                </a:rPr>
+                <a:t>2</a:t>
+              </a:r>
+              <a:r>
+                <a:rPr lang="zh-CN" altLang="en-US" sz="1600" dirty="0">
+                  <a:solidFill>
+                    <a:schemeClr val="tx1">
+                      <a:lumMod val="65000"/>
+                      <a:lumOff val="35000"/>
+                    </a:schemeClr>
+                  </a:solidFill>
+                  <a:latin typeface="宋体" panose="02010600030101010101" pitchFamily="2" charset="-122"/>
+                  <a:ea typeface="宋体" panose="02010600030101010101" pitchFamily="2" charset="-122"/>
+                </a:rPr>
+                <a:t>结果</a:t>
+              </a:r>
+            </a:p>
+          </p:txBody>
+        </p:sp>
+      </p:grpSp>
     </p:spTree>
     <p:extLst>
       <p:ext uri="{BB962C8B-B14F-4D97-AF65-F5344CB8AC3E}">
@@ -8472,6 +9784,124 @@
           <a:chExt cx="0" cy="0"/>
         </a:xfrm>
       </p:grpSpPr>
+      <p:pic>
+        <p:nvPicPr>
+          <p:cNvPr id="3" name="图片 2">
+            <a:extLst>
+              <a:ext uri="{FF2B5EF4-FFF2-40B4-BE49-F238E27FC236}">
+                <a16:creationId xmlns:a16="http://schemas.microsoft.com/office/drawing/2014/main" id="{7C21C9CB-F389-0AC6-3831-2CD1B8B1C650}"/>
+              </a:ext>
+            </a:extLst>
+          </p:cNvPr>
+          <p:cNvPicPr>
+            <a:picLocks noChangeAspect="1"/>
+          </p:cNvPicPr>
+          <p:nvPr/>
+        </p:nvPicPr>
+        <p:blipFill>
+          <a:blip r:embed="rId2"/>
+          <a:stretch>
+            <a:fillRect/>
+          </a:stretch>
+        </p:blipFill>
+        <p:spPr>
+          <a:xfrm>
+            <a:off x="6742646" y="0"/>
+            <a:ext cx="5366588" cy="6858000"/>
+          </a:xfrm>
+          <a:prstGeom prst="rect">
+            <a:avLst/>
+          </a:prstGeom>
+        </p:spPr>
+      </p:pic>
+      <p:pic>
+        <p:nvPicPr>
+          <p:cNvPr id="4" name="图片 3">
+            <a:extLst>
+              <a:ext uri="{FF2B5EF4-FFF2-40B4-BE49-F238E27FC236}">
+                <a16:creationId xmlns:a16="http://schemas.microsoft.com/office/drawing/2014/main" id="{5A60351C-8241-8C3D-0EB7-9D3FF07D171C}"/>
+              </a:ext>
+            </a:extLst>
+          </p:cNvPr>
+          <p:cNvPicPr>
+            <a:picLocks noChangeAspect="1"/>
+          </p:cNvPicPr>
+          <p:nvPr/>
+        </p:nvPicPr>
+        <p:blipFill>
+          <a:blip r:embed="rId3"/>
+          <a:srcRect l="19750" t="15872"/>
+          <a:stretch>
+            <a:fillRect/>
+          </a:stretch>
+        </p:blipFill>
+        <p:spPr>
+          <a:xfrm>
+            <a:off x="261551" y="1699260"/>
+            <a:ext cx="6389655" cy="3643341"/>
+          </a:xfrm>
+          <a:prstGeom prst="rect">
+            <a:avLst/>
+          </a:prstGeom>
+        </p:spPr>
+      </p:pic>
+      <p:sp>
+        <p:nvSpPr>
+          <p:cNvPr id="5" name="标题 8">
+            <a:extLst>
+              <a:ext uri="{FF2B5EF4-FFF2-40B4-BE49-F238E27FC236}">
+                <a16:creationId xmlns:a16="http://schemas.microsoft.com/office/drawing/2014/main" id="{B955EAE5-BF29-6714-C89F-3BD74D1FA021}"/>
+              </a:ext>
+            </a:extLst>
+          </p:cNvPr>
+          <p:cNvSpPr txBox="1">
+            <a:spLocks/>
+          </p:cNvSpPr>
+          <p:nvPr/>
+        </p:nvSpPr>
+        <p:spPr>
+          <a:xfrm>
+            <a:off x="0" y="0"/>
+            <a:ext cx="10515600" cy="1325563"/>
+          </a:xfrm>
+          <a:prstGeom prst="rect">
+            <a:avLst/>
+          </a:prstGeom>
+        </p:spPr>
+        <p:txBody>
+          <a:bodyPr vert="horz" lIns="91440" tIns="45720" rIns="91440" bIns="45720" rtlCol="0" anchor="ctr">
+            <a:normAutofit/>
+          </a:bodyPr>
+          <a:lstStyle>
+            <a:lvl1pPr algn="l" defTabSz="914400" rtl="0" eaLnBrk="1" latinLnBrk="0" hangingPunct="1">
+              <a:lnSpc>
+                <a:spcPct val="90000"/>
+              </a:lnSpc>
+              <a:spcBef>
+                <a:spcPct val="0"/>
+              </a:spcBef>
+              <a:buNone/>
+              <a:defRPr sz="4400" kern="1200">
+                <a:solidFill>
+                  <a:schemeClr val="tx1"/>
+                </a:solidFill>
+                <a:latin typeface="+mj-lt"/>
+                <a:ea typeface="+mj-ea"/>
+                <a:cs typeface="+mj-cs"/>
+              </a:defRPr>
+            </a:lvl1pPr>
+          </a:lstStyle>
+          <a:p>
+            <a:r>
+              <a:rPr lang="zh-CN" altLang="en-US" dirty="0">
+                <a:latin typeface="宋体" panose="02010600030101010101" pitchFamily="2" charset="-122"/>
+                <a:ea typeface="宋体" panose="02010600030101010101" pitchFamily="2" charset="-122"/>
+              </a:rPr>
+              <a:t>文件夹结构</a:t>
+            </a:r>
+          </a:p>
+        </p:txBody>
+      </p:sp>
     </p:spTree>
     <p:extLst>
       <p:ext uri="{BB962C8B-B14F-4D97-AF65-F5344CB8AC3E}">
@@ -8502,6 +9932,107 @@
           <a:chExt cx="0" cy="0"/>
         </a:xfrm>
       </p:grpSpPr>
+      <p:pic>
+        <p:nvPicPr>
+          <p:cNvPr id="2" name="图片 1">
+            <a:extLst>
+              <a:ext uri="{FF2B5EF4-FFF2-40B4-BE49-F238E27FC236}">
+                <a16:creationId xmlns:a16="http://schemas.microsoft.com/office/drawing/2014/main" id="{356A4CB5-8D16-BD1B-BE2E-ED986260F548}"/>
+              </a:ext>
+            </a:extLst>
+          </p:cNvPr>
+          <p:cNvPicPr>
+            <a:picLocks noChangeAspect="1"/>
+          </p:cNvPicPr>
+          <p:nvPr/>
+        </p:nvPicPr>
+        <p:blipFill>
+          <a:blip r:embed="rId2"/>
+          <a:stretch>
+            <a:fillRect/>
+          </a:stretch>
+        </p:blipFill>
+        <p:spPr>
+          <a:xfrm>
+            <a:off x="1670165" y="1426998"/>
+            <a:ext cx="8121535" cy="4829021"/>
+          </a:xfrm>
+          <a:prstGeom prst="rect">
+            <a:avLst/>
+          </a:prstGeom>
+        </p:spPr>
+      </p:pic>
+      <p:sp>
+        <p:nvSpPr>
+          <p:cNvPr id="3" name="标题 8">
+            <a:extLst>
+              <a:ext uri="{FF2B5EF4-FFF2-40B4-BE49-F238E27FC236}">
+                <a16:creationId xmlns:a16="http://schemas.microsoft.com/office/drawing/2014/main" id="{E4D88DFA-0286-65C2-AC57-08ACD70AABEF}"/>
+              </a:ext>
+            </a:extLst>
+          </p:cNvPr>
+          <p:cNvSpPr txBox="1">
+            <a:spLocks/>
+          </p:cNvSpPr>
+          <p:nvPr/>
+        </p:nvSpPr>
+        <p:spPr>
+          <a:xfrm>
+            <a:off x="0" y="0"/>
+            <a:ext cx="10515600" cy="1325563"/>
+          </a:xfrm>
+          <a:prstGeom prst="rect">
+            <a:avLst/>
+          </a:prstGeom>
+        </p:spPr>
+        <p:txBody>
+          <a:bodyPr vert="horz" lIns="91440" tIns="45720" rIns="91440" bIns="45720" rtlCol="0" anchor="ctr">
+            <a:normAutofit/>
+          </a:bodyPr>
+          <a:lstStyle>
+            <a:lvl1pPr algn="l" defTabSz="914400" rtl="0" eaLnBrk="1" latinLnBrk="0" hangingPunct="1">
+              <a:lnSpc>
+                <a:spcPct val="90000"/>
+              </a:lnSpc>
+              <a:spcBef>
+                <a:spcPct val="0"/>
+              </a:spcBef>
+              <a:buNone/>
+              <a:defRPr sz="4400" kern="1200">
+                <a:solidFill>
+                  <a:schemeClr val="tx1"/>
+                </a:solidFill>
+                <a:latin typeface="+mj-lt"/>
+                <a:ea typeface="+mj-ea"/>
+                <a:cs typeface="+mj-cs"/>
+              </a:defRPr>
+            </a:lvl1pPr>
+          </a:lstStyle>
+          <a:p>
+            <a:r>
+              <a:rPr lang="en-US" altLang="zh-CN" sz="4800" dirty="0" err="1">
+                <a:latin typeface="Times New Roman" panose="02020603050405020304" pitchFamily="18" charset="0"/>
+                <a:ea typeface="宋体" panose="02010600030101010101" pitchFamily="2" charset="-122"/>
+                <a:cs typeface="Times New Roman" panose="02020603050405020304" pitchFamily="18" charset="0"/>
+              </a:rPr>
+              <a:t>Github</a:t>
+            </a:r>
+            <a:r>
+              <a:rPr lang="en-US" altLang="zh-CN" sz="4800" dirty="0">
+                <a:latin typeface="Times New Roman" panose="02020603050405020304" pitchFamily="18" charset="0"/>
+                <a:ea typeface="宋体" panose="02010600030101010101" pitchFamily="2" charset="-122"/>
+                <a:cs typeface="Times New Roman" panose="02020603050405020304" pitchFamily="18" charset="0"/>
+              </a:rPr>
+              <a:t> contributions</a:t>
+            </a:r>
+            <a:endParaRPr lang="zh-CN" altLang="en-US" sz="4800" dirty="0">
+              <a:latin typeface="Times New Roman" panose="02020603050405020304" pitchFamily="18" charset="0"/>
+              <a:ea typeface="宋体" panose="02010600030101010101" pitchFamily="2" charset="-122"/>
+              <a:cs typeface="Times New Roman" panose="02020603050405020304" pitchFamily="18" charset="0"/>
+            </a:endParaRPr>
+          </a:p>
+        </p:txBody>
+      </p:sp>
     </p:spTree>
     <p:extLst>
       <p:ext uri="{BB962C8B-B14F-4D97-AF65-F5344CB8AC3E}">

</xml_diff>